<commit_message>
updated mpc presentation slides
</commit_message>
<xml_diff>
--- a/mpc.pptx
+++ b/mpc.pptx
@@ -31,7 +31,10 @@
     <p:sldId id="280" r:id="rId25"/>
     <p:sldId id="281" r:id="rId26"/>
     <p:sldId id="282" r:id="rId27"/>
-    <p:sldId id="274" r:id="rId28"/>
+    <p:sldId id="283" r:id="rId28"/>
+    <p:sldId id="284" r:id="rId29"/>
+    <p:sldId id="285" r:id="rId30"/>
+    <p:sldId id="274" r:id="rId31"/>
   </p:sldIdLst>
   <p:sldSz cx="9144000" cy="6858000" type="screen4x3"/>
   <p:notesSz cx="6858000" cy="9144000"/>
@@ -366,7 +369,8 @@
           <a:p>
             <a:fld id="{AEE03750-AB92-694C-9267-0EC3862E6B14}" type="datetimeFigureOut">
               <a:rPr lang="en-US" smtClean="0"/>
-              <a:t>11/14/12</a:t>
+              <a:pPr/>
+              <a:t>11/25/12</a:t>
             </a:fld>
             <a:endParaRPr lang="en-US"/>
           </a:p>
@@ -440,6 +444,7 @@
           <a:p>
             <a:fld id="{160882FE-BBF2-0B45-AA15-17E39FA40276}" type="slidenum">
               <a:rPr lang="en-US" smtClean="0"/>
+              <a:pPr/>
               <a:t>‹#›</a:t>
             </a:fld>
             <a:endParaRPr lang="en-US"/>
@@ -511,7 +516,8 @@
           <a:p>
             <a:fld id="{AEE03750-AB92-694C-9267-0EC3862E6B14}" type="datetimeFigureOut">
               <a:rPr lang="en-US" smtClean="0"/>
-              <a:t>11/14/12</a:t>
+              <a:pPr/>
+              <a:t>11/25/12</a:t>
             </a:fld>
             <a:endParaRPr lang="en-US"/>
           </a:p>
@@ -553,6 +559,7 @@
           <a:p>
             <a:fld id="{160882FE-BBF2-0B45-AA15-17E39FA40276}" type="slidenum">
               <a:rPr lang="en-US" smtClean="0"/>
+              <a:pPr/>
               <a:t>‹#›</a:t>
             </a:fld>
             <a:endParaRPr lang="en-US"/>
@@ -964,7 +971,8 @@
           <a:p>
             <a:fld id="{AEE03750-AB92-694C-9267-0EC3862E6B14}" type="datetimeFigureOut">
               <a:rPr lang="en-US" smtClean="0"/>
-              <a:t>11/14/12</a:t>
+              <a:pPr/>
+              <a:t>11/25/12</a:t>
             </a:fld>
             <a:endParaRPr lang="en-US"/>
           </a:p>
@@ -1006,6 +1014,7 @@
           <a:p>
             <a:fld id="{160882FE-BBF2-0B45-AA15-17E39FA40276}" type="slidenum">
               <a:rPr lang="en-US" smtClean="0"/>
+              <a:pPr/>
               <a:t>‹#›</a:t>
             </a:fld>
             <a:endParaRPr lang="en-US"/>
@@ -1332,7 +1341,8 @@
           <a:p>
             <a:fld id="{AEE03750-AB92-694C-9267-0EC3862E6B14}" type="datetimeFigureOut">
               <a:rPr lang="en-US" smtClean="0"/>
-              <a:t>11/14/12</a:t>
+              <a:pPr/>
+              <a:t>11/25/12</a:t>
             </a:fld>
             <a:endParaRPr lang="en-US"/>
           </a:p>
@@ -1374,6 +1384,7 @@
           <a:p>
             <a:fld id="{160882FE-BBF2-0B45-AA15-17E39FA40276}" type="slidenum">
               <a:rPr lang="en-US" smtClean="0"/>
+              <a:pPr/>
               <a:t>‹#›</a:t>
             </a:fld>
             <a:endParaRPr lang="en-US"/>
@@ -1422,7 +1433,8 @@
           <a:p>
             <a:fld id="{AEE03750-AB92-694C-9267-0EC3862E6B14}" type="datetimeFigureOut">
               <a:rPr lang="en-US" smtClean="0"/>
-              <a:t>11/14/12</a:t>
+              <a:pPr/>
+              <a:t>11/25/12</a:t>
             </a:fld>
             <a:endParaRPr lang="en-US"/>
           </a:p>
@@ -1464,6 +1476,7 @@
           <a:p>
             <a:fld id="{160882FE-BBF2-0B45-AA15-17E39FA40276}" type="slidenum">
               <a:rPr lang="en-US" smtClean="0"/>
+              <a:pPr/>
               <a:t>‹#›</a:t>
             </a:fld>
             <a:endParaRPr lang="en-US"/>
@@ -1697,7 +1710,8 @@
           <a:p>
             <a:fld id="{AEE03750-AB92-694C-9267-0EC3862E6B14}" type="datetimeFigureOut">
               <a:rPr lang="en-US" smtClean="0"/>
-              <a:t>11/14/12</a:t>
+              <a:pPr/>
+              <a:t>11/25/12</a:t>
             </a:fld>
             <a:endParaRPr lang="en-US"/>
           </a:p>
@@ -1739,6 +1753,7 @@
           <a:p>
             <a:fld id="{160882FE-BBF2-0B45-AA15-17E39FA40276}" type="slidenum">
               <a:rPr lang="en-US" smtClean="0"/>
+              <a:pPr/>
               <a:t>‹#›</a:t>
             </a:fld>
             <a:endParaRPr lang="en-US"/>
@@ -1887,7 +1902,8 @@
           <a:p>
             <a:fld id="{AEE03750-AB92-694C-9267-0EC3862E6B14}" type="datetimeFigureOut">
               <a:rPr lang="en-US" smtClean="0"/>
-              <a:t>11/14/12</a:t>
+              <a:pPr/>
+              <a:t>11/25/12</a:t>
             </a:fld>
             <a:endParaRPr lang="en-US"/>
           </a:p>
@@ -1929,6 +1945,7 @@
           <a:p>
             <a:fld id="{160882FE-BBF2-0B45-AA15-17E39FA40276}" type="slidenum">
               <a:rPr lang="en-US" smtClean="0"/>
+              <a:pPr/>
               <a:t>‹#›</a:t>
             </a:fld>
             <a:endParaRPr lang="en-US"/>
@@ -2626,7 +2643,8 @@
           <a:p>
             <a:fld id="{AEE03750-AB92-694C-9267-0EC3862E6B14}" type="datetimeFigureOut">
               <a:rPr lang="en-US" smtClean="0"/>
-              <a:t>11/14/12</a:t>
+              <a:pPr/>
+              <a:t>11/25/12</a:t>
             </a:fld>
             <a:endParaRPr lang="en-US"/>
           </a:p>
@@ -2668,6 +2686,7 @@
           <a:p>
             <a:fld id="{160882FE-BBF2-0B45-AA15-17E39FA40276}" type="slidenum">
               <a:rPr lang="en-US" smtClean="0"/>
+              <a:pPr/>
               <a:t>‹#›</a:t>
             </a:fld>
             <a:endParaRPr lang="en-US"/>
@@ -2964,7 +2983,8 @@
           <a:p>
             <a:fld id="{AEE03750-AB92-694C-9267-0EC3862E6B14}" type="datetimeFigureOut">
               <a:rPr lang="en-US" smtClean="0"/>
-              <a:t>11/14/12</a:t>
+              <a:pPr/>
+              <a:t>11/25/12</a:t>
             </a:fld>
             <a:endParaRPr lang="en-US"/>
           </a:p>
@@ -3006,6 +3026,7 @@
           <a:p>
             <a:fld id="{160882FE-BBF2-0B45-AA15-17E39FA40276}" type="slidenum">
               <a:rPr lang="en-US" smtClean="0"/>
+              <a:pPr/>
               <a:t>‹#›</a:t>
             </a:fld>
             <a:endParaRPr lang="en-US"/>
@@ -3561,7 +3582,8 @@
           <a:p>
             <a:fld id="{AEE03750-AB92-694C-9267-0EC3862E6B14}" type="datetimeFigureOut">
               <a:rPr lang="en-US" smtClean="0"/>
-              <a:t>11/14/12</a:t>
+              <a:pPr/>
+              <a:t>11/25/12</a:t>
             </a:fld>
             <a:endParaRPr lang="en-US"/>
           </a:p>
@@ -3603,6 +3625,7 @@
           <a:p>
             <a:fld id="{160882FE-BBF2-0B45-AA15-17E39FA40276}" type="slidenum">
               <a:rPr lang="en-US" smtClean="0"/>
+              <a:pPr/>
               <a:t>‹#›</a:t>
             </a:fld>
             <a:endParaRPr lang="en-US"/>
@@ -3740,7 +3763,8 @@
           <a:p>
             <a:fld id="{AEE03750-AB92-694C-9267-0EC3862E6B14}" type="datetimeFigureOut">
               <a:rPr lang="en-US" smtClean="0"/>
-              <a:t>11/14/12</a:t>
+              <a:pPr/>
+              <a:t>11/25/12</a:t>
             </a:fld>
             <a:endParaRPr lang="en-US"/>
           </a:p>
@@ -3782,6 +3806,7 @@
           <a:p>
             <a:fld id="{160882FE-BBF2-0B45-AA15-17E39FA40276}" type="slidenum">
               <a:rPr lang="en-US" smtClean="0"/>
+              <a:pPr/>
               <a:t>‹#›</a:t>
             </a:fld>
             <a:endParaRPr lang="en-US"/>
@@ -3905,7 +3930,8 @@
           <a:p>
             <a:fld id="{AEE03750-AB92-694C-9267-0EC3862E6B14}" type="datetimeFigureOut">
               <a:rPr lang="en-US" smtClean="0"/>
-              <a:t>11/14/12</a:t>
+              <a:pPr/>
+              <a:t>11/25/12</a:t>
             </a:fld>
             <a:endParaRPr lang="en-US"/>
           </a:p>
@@ -3947,6 +3973,7 @@
           <a:p>
             <a:fld id="{160882FE-BBF2-0B45-AA15-17E39FA40276}" type="slidenum">
               <a:rPr lang="en-US" smtClean="0"/>
+              <a:pPr/>
               <a:t>‹#›</a:t>
             </a:fld>
             <a:endParaRPr lang="en-US"/>
@@ -4094,7 +4121,8 @@
           <a:p>
             <a:fld id="{AEE03750-AB92-694C-9267-0EC3862E6B14}" type="datetimeFigureOut">
               <a:rPr lang="en-US" smtClean="0"/>
-              <a:t>11/14/12</a:t>
+              <a:pPr/>
+              <a:t>11/25/12</a:t>
             </a:fld>
             <a:endParaRPr lang="en-US"/>
           </a:p>
@@ -4136,6 +4164,7 @@
           <a:p>
             <a:fld id="{160882FE-BBF2-0B45-AA15-17E39FA40276}" type="slidenum">
               <a:rPr lang="en-US" smtClean="0"/>
+              <a:pPr/>
               <a:t>‹#›</a:t>
             </a:fld>
             <a:endParaRPr lang="en-US"/>
@@ -4513,7 +4542,8 @@
           <a:p>
             <a:fld id="{AEE03750-AB92-694C-9267-0EC3862E6B14}" type="datetimeFigureOut">
               <a:rPr lang="en-US" smtClean="0"/>
-              <a:t>11/14/12</a:t>
+              <a:pPr/>
+              <a:t>11/25/12</a:t>
             </a:fld>
             <a:endParaRPr lang="en-US"/>
           </a:p>
@@ -4578,6 +4608,7 @@
           <a:p>
             <a:fld id="{160882FE-BBF2-0B45-AA15-17E39FA40276}" type="slidenum">
               <a:rPr lang="en-US" smtClean="0"/>
+              <a:pPr/>
               <a:t>‹#›</a:t>
             </a:fld>
             <a:endParaRPr lang="en-US"/>
@@ -4811,7 +4842,8 @@
           <a:p>
             <a:fld id="{AEE03750-AB92-694C-9267-0EC3862E6B14}" type="datetimeFigureOut">
               <a:rPr lang="en-US" smtClean="0"/>
-              <a:t>11/14/12</a:t>
+              <a:pPr/>
+              <a:t>11/25/12</a:t>
             </a:fld>
             <a:endParaRPr lang="en-US"/>
           </a:p>
@@ -4853,6 +4885,7 @@
           <a:p>
             <a:fld id="{160882FE-BBF2-0B45-AA15-17E39FA40276}" type="slidenum">
               <a:rPr lang="en-US" smtClean="0"/>
+              <a:pPr/>
               <a:t>‹#›</a:t>
             </a:fld>
             <a:endParaRPr lang="en-US"/>
@@ -5212,7 +5245,8 @@
           <a:p>
             <a:fld id="{AEE03750-AB92-694C-9267-0EC3862E6B14}" type="datetimeFigureOut">
               <a:rPr lang="en-US" smtClean="0"/>
-              <a:t>11/14/12</a:t>
+              <a:pPr/>
+              <a:t>11/25/12</a:t>
             </a:fld>
             <a:endParaRPr lang="en-US"/>
           </a:p>
@@ -5254,6 +5288,7 @@
           <a:p>
             <a:fld id="{160882FE-BBF2-0B45-AA15-17E39FA40276}" type="slidenum">
               <a:rPr lang="en-US" smtClean="0"/>
+              <a:pPr/>
               <a:t>‹#›</a:t>
             </a:fld>
             <a:endParaRPr lang="en-US"/>
@@ -5602,7 +5637,8 @@
           <a:p>
             <a:fld id="{AEE03750-AB92-694C-9267-0EC3862E6B14}" type="datetimeFigureOut">
               <a:rPr lang="en-US" smtClean="0"/>
-              <a:t>11/14/12</a:t>
+              <a:pPr/>
+              <a:t>11/25/12</a:t>
             </a:fld>
             <a:endParaRPr lang="en-US"/>
           </a:p>
@@ -5644,6 +5680,7 @@
           <a:p>
             <a:fld id="{160882FE-BBF2-0B45-AA15-17E39FA40276}" type="slidenum">
               <a:rPr lang="en-US" smtClean="0"/>
+              <a:pPr/>
               <a:t>‹#›</a:t>
             </a:fld>
             <a:endParaRPr lang="en-US"/>
@@ -5885,7 +5922,8 @@
           <a:p>
             <a:fld id="{AEE03750-AB92-694C-9267-0EC3862E6B14}" type="datetimeFigureOut">
               <a:rPr lang="en-US" smtClean="0"/>
-              <a:t>11/14/12</a:t>
+              <a:pPr/>
+              <a:t>11/25/12</a:t>
             </a:fld>
             <a:endParaRPr lang="en-US"/>
           </a:p>
@@ -5927,6 +5965,7 @@
           <a:p>
             <a:fld id="{160882FE-BBF2-0B45-AA15-17E39FA40276}" type="slidenum">
               <a:rPr lang="en-US" smtClean="0"/>
+              <a:pPr/>
               <a:t>‹#›</a:t>
             </a:fld>
             <a:endParaRPr lang="en-US"/>
@@ -6324,7 +6363,8 @@
           <a:p>
             <a:fld id="{AEE03750-AB92-694C-9267-0EC3862E6B14}" type="datetimeFigureOut">
               <a:rPr lang="en-US" smtClean="0"/>
-              <a:t>11/14/12</a:t>
+              <a:pPr/>
+              <a:t>11/25/12</a:t>
             </a:fld>
             <a:endParaRPr lang="en-US"/>
           </a:p>
@@ -6366,6 +6406,7 @@
           <a:p>
             <a:fld id="{160882FE-BBF2-0B45-AA15-17E39FA40276}" type="slidenum">
               <a:rPr lang="en-US" smtClean="0"/>
+              <a:pPr/>
               <a:t>‹#›</a:t>
             </a:fld>
             <a:endParaRPr lang="en-US"/>
@@ -6618,7 +6659,8 @@
           <a:p>
             <a:fld id="{AEE03750-AB92-694C-9267-0EC3862E6B14}" type="datetimeFigureOut">
               <a:rPr lang="en-US" smtClean="0"/>
-              <a:t>11/14/12</a:t>
+              <a:pPr/>
+              <a:t>11/25/12</a:t>
             </a:fld>
             <a:endParaRPr lang="en-US"/>
           </a:p>
@@ -6660,6 +6702,7 @@
           <a:p>
             <a:fld id="{160882FE-BBF2-0B45-AA15-17E39FA40276}" type="slidenum">
               <a:rPr lang="en-US" smtClean="0"/>
+              <a:pPr/>
               <a:t>‹#›</a:t>
             </a:fld>
             <a:endParaRPr lang="en-US"/>
@@ -6910,7 +6953,8 @@
           <a:p>
             <a:fld id="{AEE03750-AB92-694C-9267-0EC3862E6B14}" type="datetimeFigureOut">
               <a:rPr lang="en-US" smtClean="0"/>
-              <a:t>11/14/12</a:t>
+              <a:pPr/>
+              <a:t>11/25/12</a:t>
             </a:fld>
             <a:endParaRPr lang="en-US"/>
           </a:p>
@@ -6998,6 +7042,7 @@
           <a:p>
             <a:fld id="{160882FE-BBF2-0B45-AA15-17E39FA40276}" type="slidenum">
               <a:rPr lang="en-US" smtClean="0"/>
+              <a:pPr/>
               <a:t>‹#›</a:t>
             </a:fld>
             <a:endParaRPr lang="en-US"/>
@@ -7967,15 +8012,7 @@
             <a:pPr lvl="1"/>
             <a:r>
               <a:rPr lang="en-US" dirty="0" smtClean="0"/>
-              <a:t>MPC for high-level trajectory planning </a:t>
-            </a:r>
-            <a:r>
-              <a:rPr lang="en-US" dirty="0" smtClean="0"/>
-              <a:t>and leave inner loop control to classical </a:t>
-            </a:r>
-            <a:r>
-              <a:rPr lang="en-US" dirty="0" smtClean="0"/>
-              <a:t>controller. Slow dynamics, but requires longer horizon.</a:t>
+              <a:t>MPC for high-level trajectory planning and leave inner loop control to classical controller. Slow dynamics, but requires longer horizon.</a:t>
             </a:r>
           </a:p>
           <a:p>
@@ -8789,11 +8826,7 @@
             <a:pPr lvl="1"/>
             <a:r>
               <a:rPr lang="en-US" dirty="0" smtClean="0"/>
-              <a:t>Comparison with PID and discrete </a:t>
-            </a:r>
-            <a:r>
-              <a:rPr lang="en-US" dirty="0" smtClean="0"/>
-              <a:t>LQR</a:t>
+              <a:t>Comparison with PID and discrete LQR</a:t>
             </a:r>
           </a:p>
           <a:p>
@@ -9549,7 +9582,15 @@
           <a:p>
             <a:r>
               <a:rPr lang="en-US" dirty="0" smtClean="0"/>
-              <a:t>Game #4</a:t>
+              <a:t>Game </a:t>
+            </a:r>
+            <a:r>
+              <a:rPr lang="en-US" dirty="0" smtClean="0"/>
+              <a:t>#</a:t>
+            </a:r>
+            <a:r>
+              <a:rPr lang="en-US" dirty="0" smtClean="0"/>
+              <a:t>4-5</a:t>
             </a:r>
             <a:endParaRPr lang="en-US" dirty="0"/>
           </a:p>
@@ -9657,7 +9698,11 @@
           <a:p>
             <a:r>
               <a:rPr lang="en-US" dirty="0" smtClean="0"/>
-              <a:t>Game #5</a:t>
+              <a:t>Game </a:t>
+            </a:r>
+            <a:r>
+              <a:rPr lang="en-US" dirty="0" smtClean="0"/>
+              <a:t>#4-5</a:t>
             </a:r>
             <a:endParaRPr lang="en-US" dirty="0"/>
           </a:p>
@@ -9676,7 +9721,7 @@
         <p:spPr/>
         <p:txBody>
           <a:bodyPr>
-            <a:normAutofit fontScale="92500" lnSpcReduction="10000"/>
+            <a:normAutofit fontScale="92500" lnSpcReduction="20000"/>
           </a:bodyPr>
           <a:lstStyle/>
           <a:p>
@@ -9684,6 +9729,49 @@
               <a:rPr lang="en-US" dirty="0" smtClean="0"/>
               <a:t>Do it as fast as possible</a:t>
             </a:r>
+            <a:endParaRPr lang="en-US" dirty="0" smtClean="0"/>
+          </a:p>
+          <a:p>
+            <a:pPr lvl="1"/>
+            <a:r>
+              <a:rPr lang="en-US" dirty="0" smtClean="0"/>
+              <a:t>Look </a:t>
+            </a:r>
+            <a:r>
+              <a:rPr lang="en-US" dirty="0" smtClean="0"/>
+              <a:t>into ‘inexact’ and fast solvers tailored for MPC</a:t>
+            </a:r>
+          </a:p>
+          <a:p>
+            <a:pPr lvl="2"/>
+            <a:r>
+              <a:rPr lang="en-US" dirty="0" smtClean="0"/>
+              <a:t>Work by </a:t>
+            </a:r>
+            <a:r>
+              <a:rPr lang="en-US" dirty="0" err="1" smtClean="0"/>
+              <a:t>Y.Wang</a:t>
+            </a:r>
+            <a:r>
+              <a:rPr lang="en-US" dirty="0" smtClean="0"/>
+              <a:t> and </a:t>
+            </a:r>
+            <a:r>
+              <a:rPr lang="en-US" dirty="0" err="1" smtClean="0"/>
+              <a:t>S.Boyd</a:t>
+            </a:r>
+            <a:r>
+              <a:rPr lang="en-US" dirty="0" smtClean="0"/>
+              <a:t> might be </a:t>
+            </a:r>
+            <a:r>
+              <a:rPr lang="en-US" dirty="0" smtClean="0"/>
+              <a:t>relevant</a:t>
+            </a:r>
+            <a:br>
+              <a:rPr lang="en-US" dirty="0" smtClean="0"/>
+            </a:br>
+            <a:endParaRPr lang="en-US" dirty="0" smtClean="0"/>
           </a:p>
           <a:p>
             <a:pPr lvl="1"/>
@@ -9701,34 +9789,8 @@
             </a:r>
           </a:p>
           <a:p>
-            <a:pPr lvl="1"/>
-            <a:r>
-              <a:rPr lang="en-US" dirty="0" smtClean="0"/>
-              <a:t>Look into ‘inexact’ and fast solvers tailored for MPC</a:t>
-            </a:r>
-          </a:p>
-          <a:p>
             <a:pPr lvl="2"/>
-            <a:r>
-              <a:rPr lang="en-US" dirty="0" smtClean="0"/>
-              <a:t>Work by </a:t>
-            </a:r>
-            <a:r>
-              <a:rPr lang="en-US" dirty="0" err="1" smtClean="0"/>
-              <a:t>Y.Wang</a:t>
-            </a:r>
-            <a:r>
-              <a:rPr lang="en-US" dirty="0" smtClean="0"/>
-              <a:t> and </a:t>
-            </a:r>
-            <a:r>
-              <a:rPr lang="en-US" dirty="0" err="1" smtClean="0"/>
-              <a:t>S.Boyd</a:t>
-            </a:r>
-            <a:r>
-              <a:rPr lang="en-US" dirty="0" smtClean="0"/>
-              <a:t> might be relevant</a:t>
-            </a:r>
+            <a:endParaRPr lang="en-US" dirty="0" smtClean="0"/>
           </a:p>
           <a:p>
             <a:r>
@@ -9788,330 +9850,266 @@
             <p:ph type="title"/>
           </p:nvPr>
         </p:nvSpPr>
-        <p:spPr/>
-        <p:txBody>
-          <a:bodyPr/>
-          <a:lstStyle/>
-          <a:p>
-            <a:r>
-              <a:rPr lang="en-US" dirty="0" smtClean="0"/>
-              <a:t>Equations …</a:t>
+        <p:spPr>
+          <a:xfrm>
+            <a:off x="914400" y="69057"/>
+            <a:ext cx="7313613" cy="868362"/>
+          </a:xfrm>
+        </p:spPr>
+        <p:txBody>
+          <a:bodyPr/>
+          <a:lstStyle/>
+          <a:p>
+            <a:r>
+              <a:rPr lang="en-US" dirty="0" smtClean="0"/>
+              <a:t>Game #4-5</a:t>
             </a:r>
             <a:endParaRPr lang="en-US" dirty="0"/>
           </a:p>
         </p:txBody>
       </p:sp>
-      <p:sp>
-        <p:nvSpPr>
-          <p:cNvPr id="3" name="Content Placeholder 2"/>
-          <p:cNvSpPr>
-            <a:spLocks noGrp="1"/>
-          </p:cNvSpPr>
+      <p:pic>
+        <p:nvPicPr>
+          <p:cNvPr id="4" name="Content Placeholder 3" descr="fast_mpc_u0.png"/>
+          <p:cNvPicPr>
+            <a:picLocks noGrp="1" noChangeAspect="1"/>
+          </p:cNvPicPr>
           <p:nvPr>
             <p:ph idx="1"/>
           </p:nvPr>
-        </p:nvSpPr>
-        <p:spPr/>
-        <p:txBody>
-          <a:bodyPr>
-            <a:normAutofit fontScale="62500" lnSpcReduction="20000"/>
-          </a:bodyPr>
-          <a:lstStyle/>
-          <a:p>
-            <a:r>
-              <a:rPr lang="en-US" dirty="0" smtClean="0"/>
-              <a:t>Objective: J</a:t>
-            </a:r>
-            <a:r>
-              <a:rPr lang="en-US" dirty="0" smtClean="0"/>
-              <a:t>(x(0),U_0) = \overset{N-1}{\underset{k=0}{\Sigma}}(x^t_kQx_k + </a:t>
-            </a:r>
-            <a:r>
-              <a:rPr lang="en-US" dirty="0" err="1" smtClean="0"/>
-              <a:t>u^t_kRu_k</a:t>
-            </a:r>
-            <a:r>
-              <a:rPr lang="en-US" dirty="0" smtClean="0"/>
-              <a:t>) + </a:t>
-            </a:r>
-            <a:r>
-              <a:rPr lang="en-US" dirty="0" err="1" smtClean="0"/>
-              <a:t>x^</a:t>
-            </a:r>
-            <a:r>
-              <a:rPr lang="en-US" dirty="0" err="1" smtClean="0"/>
-              <a:t>t_NPx_N</a:t>
-            </a:r>
-            <a:endParaRPr lang="en-US" dirty="0" smtClean="0"/>
-          </a:p>
-          <a:p>
-            <a:r>
-              <a:rPr lang="en-US" dirty="0" smtClean="0"/>
-              <a:t>Optimization: \</a:t>
-            </a:r>
-            <a:r>
-              <a:rPr lang="en-US" dirty="0" err="1" smtClean="0"/>
-              <a:t>begin{aligned</a:t>
-            </a:r>
-            <a:r>
-              <a:rPr lang="en-US" dirty="0" smtClean="0"/>
-              <a:t>}&amp; \underset{U_0}{\text{minimize}}&amp; &amp; J(x(0),U_0) \\&amp; \</a:t>
-            </a:r>
-            <a:r>
-              <a:rPr lang="en-US" dirty="0" err="1" smtClean="0"/>
-              <a:t>text{subject</a:t>
-            </a:r>
-            <a:r>
-              <a:rPr lang="en-US" dirty="0" smtClean="0"/>
-              <a:t> to}&amp; &amp; x(k+1) = </a:t>
-            </a:r>
-            <a:r>
-              <a:rPr lang="en-US" dirty="0" err="1" smtClean="0"/>
-              <a:t>Ax(k</a:t>
-            </a:r>
-            <a:r>
-              <a:rPr lang="en-US" dirty="0" smtClean="0"/>
-              <a:t>) + </a:t>
-            </a:r>
-            <a:r>
-              <a:rPr lang="en-US" dirty="0" err="1" smtClean="0"/>
-              <a:t>Bu(k</a:t>
-            </a:r>
-            <a:r>
-              <a:rPr lang="en-US" dirty="0" smtClean="0"/>
-              <a:t>)\ </a:t>
-            </a:r>
-            <a:r>
-              <a:rPr lang="en-US" dirty="0" err="1" smtClean="0"/>
-              <a:t>k</a:t>
-            </a:r>
-            <a:r>
-              <a:rPr lang="en-US" dirty="0" smtClean="0"/>
-              <a:t> = 1, \</a:t>
-            </a:r>
-            <a:r>
-              <a:rPr lang="en-US" dirty="0" err="1" smtClean="0"/>
-              <a:t>ldots</a:t>
-            </a:r>
-            <a:r>
-              <a:rPr lang="en-US" dirty="0" smtClean="0"/>
-              <a:t>, N-1 \\&amp; &amp; &amp; x_0 = x(0) \\&amp; &amp; &amp; </a:t>
-            </a:r>
-            <a:r>
-              <a:rPr lang="en-US" dirty="0" err="1" smtClean="0"/>
-              <a:t>x(N</a:t>
-            </a:r>
-            <a:r>
-              <a:rPr lang="en-US" dirty="0" smtClean="0"/>
-              <a:t>) \in \</a:t>
-            </a:r>
-            <a:r>
-              <a:rPr lang="en-US" dirty="0" err="1" smtClean="0"/>
-              <a:t>chi_{f</a:t>
-            </a:r>
-            <a:r>
-              <a:rPr lang="en-US" dirty="0" smtClean="0"/>
-              <a:t>} \\&amp; &amp; &amp; G X \le </a:t>
-            </a:r>
-            <a:r>
-              <a:rPr lang="en-US" dirty="0" err="1" smtClean="0"/>
-              <a:t>h</a:t>
-            </a:r>
-            <a:r>
-              <a:rPr lang="en-US" dirty="0" smtClean="0"/>
-              <a:t> \\&amp; &amp; &amp; F U \le </a:t>
-            </a:r>
-            <a:r>
-              <a:rPr lang="en-US" dirty="0" err="1" smtClean="0"/>
-              <a:t>e\end{aligned</a:t>
-            </a:r>
-            <a:r>
-              <a:rPr lang="en-US" dirty="0" smtClean="0"/>
-              <a:t>}</a:t>
-            </a:r>
-            <a:endParaRPr lang="en-US" dirty="0" smtClean="0"/>
-          </a:p>
-          <a:p>
-            <a:r>
-              <a:rPr lang="en-US" dirty="0" smtClean="0"/>
-              <a:t>EOM: \</a:t>
-            </a:r>
-            <a:r>
-              <a:rPr lang="en-US" dirty="0" err="1" smtClean="0"/>
-              <a:t>dot{x</a:t>
-            </a:r>
-            <a:r>
-              <a:rPr lang="en-US" dirty="0" smtClean="0"/>
-              <a:t>} = \left[\</a:t>
-            </a:r>
-            <a:r>
-              <a:rPr lang="en-US" dirty="0" err="1" smtClean="0"/>
-              <a:t>begin{array}{c</a:t>
-            </a:r>
-            <a:r>
-              <a:rPr lang="en-US" dirty="0" smtClean="0"/>
-              <a:t>}\dot{\theta} \\\</a:t>
-            </a:r>
-            <a:r>
-              <a:rPr lang="en-US" dirty="0" err="1" smtClean="0"/>
-              <a:t>dot{q}\end{array}\right</a:t>
-            </a:r>
-            <a:r>
-              <a:rPr lang="en-US" dirty="0" smtClean="0"/>
-              <a:t>] = \left[\begin{array}{cc}0 &amp; 1\\0 &amp; 0\end{array}\right]\left[\begin{array}{c}\theta \\</a:t>
-            </a:r>
-            <a:r>
-              <a:rPr lang="en-US" dirty="0" err="1" smtClean="0"/>
-              <a:t>q\end{array}\right</a:t>
-            </a:r>
-            <a:r>
-              <a:rPr lang="en-US" dirty="0" smtClean="0"/>
-              <a:t>] + \frac{1}{I_{yy}}\left[\begin{array}{cccc}0 &amp; 0 &amp; 0 &amp; 0\\d_1 &amp; d_2 &amp; d_3 &amp; d_4\end{array}\right]\left[\begin{array}{c}t_1 \\\ldots\\t_4\end{array}\right] \\\left[\</a:t>
-            </a:r>
-            <a:r>
-              <a:rPr lang="en-US" dirty="0" err="1" smtClean="0"/>
-              <a:t>begin{array}{c}F_{x,i</a:t>
-            </a:r>
-            <a:r>
-              <a:rPr lang="en-US" dirty="0" smtClean="0"/>
-              <a:t>} \\</a:t>
-            </a:r>
-            <a:r>
-              <a:rPr lang="en-US" dirty="0" err="1" smtClean="0"/>
-              <a:t>F_{z,i}\end{array}\right</a:t>
-            </a:r>
-            <a:r>
-              <a:rPr lang="en-US" dirty="0" smtClean="0"/>
-              <a:t>] = \left[\</a:t>
-            </a:r>
-            <a:r>
-              <a:rPr lang="en-US" dirty="0" err="1" smtClean="0"/>
-              <a:t>begin{array}{cc}\cos</a:t>
-            </a:r>
-            <a:r>
-              <a:rPr lang="en-US" dirty="0" smtClean="0"/>
-              <a:t> \theta &amp; -\sin \theta \\-\sin \theta &amp; -\</a:t>
-            </a:r>
-            <a:r>
-              <a:rPr lang="en-US" dirty="0" err="1" smtClean="0"/>
-              <a:t>cos</a:t>
-            </a:r>
-            <a:r>
-              <a:rPr lang="en-US" dirty="0" smtClean="0"/>
-              <a:t> \theta\end{array}\right]\left[\begin{array}{c}0 \\\Sigma </a:t>
-            </a:r>
-            <a:r>
-              <a:rPr lang="en-US" dirty="0" err="1" smtClean="0"/>
-              <a:t>t_i\end{array}\right</a:t>
-            </a:r>
-            <a:r>
-              <a:rPr lang="en-US" dirty="0" smtClean="0"/>
-              <a:t>]</a:t>
-            </a:r>
-          </a:p>
-          <a:p>
-            <a:r>
-              <a:rPr lang="en-US" dirty="0" smtClean="0"/>
-              <a:t>Final Set constraint: </a:t>
-            </a:r>
-            <a:r>
-              <a:rPr lang="en-US" dirty="0" err="1" smtClean="0"/>
-              <a:t>x_N</a:t>
-            </a:r>
-            <a:r>
-              <a:rPr lang="en-US" dirty="0" smtClean="0"/>
-              <a:t> </a:t>
-            </a:r>
-            <a:r>
-              <a:rPr lang="en-US" dirty="0" smtClean="0"/>
-              <a:t>= </a:t>
-            </a:r>
-            <a:r>
-              <a:rPr lang="en-US" dirty="0" err="1" smtClean="0"/>
-              <a:t>Ax_N</a:t>
-            </a:r>
-            <a:r>
-              <a:rPr lang="en-US" dirty="0" smtClean="0"/>
-              <a:t> + Bu_{N-1} + </a:t>
-            </a:r>
-            <a:r>
-              <a:rPr lang="en-US" dirty="0" err="1" smtClean="0"/>
-              <a:t>B_d</a:t>
-            </a:r>
-            <a:r>
-              <a:rPr lang="en-US" dirty="0" smtClean="0"/>
-              <a:t> \</a:t>
-            </a:r>
-            <a:r>
-              <a:rPr lang="en-US" dirty="0" err="1" smtClean="0"/>
-              <a:t>hat{M}_{yd</a:t>
-            </a:r>
-            <a:r>
-              <a:rPr lang="en-US" dirty="0" smtClean="0"/>
-              <a:t>}\</a:t>
-            </a:r>
-            <a:r>
-              <a:rPr lang="en-US" dirty="0" smtClean="0"/>
-              <a:t>\</a:t>
-            </a:r>
-          </a:p>
-          <a:p>
-            <a:r>
-              <a:rPr lang="en-US" dirty="0" smtClean="0"/>
-              <a:t>Disturbance: </a:t>
-            </a:r>
-            <a:r>
-              <a:rPr lang="en-US" dirty="0" smtClean="0"/>
-              <a:t>x_{k+1} = </a:t>
-            </a:r>
-            <a:r>
-              <a:rPr lang="en-US" dirty="0" err="1" smtClean="0"/>
-              <a:t>Ax_{k</a:t>
-            </a:r>
-            <a:r>
-              <a:rPr lang="en-US" dirty="0" smtClean="0"/>
-              <a:t>} + </a:t>
-            </a:r>
-            <a:r>
-              <a:rPr lang="en-US" dirty="0" err="1" smtClean="0"/>
-              <a:t>Bu_{k</a:t>
-            </a:r>
-            <a:r>
-              <a:rPr lang="en-US" dirty="0" smtClean="0"/>
-              <a:t>} + </a:t>
-            </a:r>
-            <a:r>
-              <a:rPr lang="en-US" dirty="0" err="1" smtClean="0"/>
-              <a:t>B_d</a:t>
-            </a:r>
-            <a:r>
-              <a:rPr lang="en-US" dirty="0" smtClean="0"/>
-              <a:t> \</a:t>
-            </a:r>
-            <a:r>
-              <a:rPr lang="en-US" dirty="0" err="1" smtClean="0"/>
-              <a:t>hat{M}_{yd</a:t>
-            </a:r>
-            <a:r>
-              <a:rPr lang="en-US" dirty="0" smtClean="0"/>
-              <a:t>}\\</a:t>
-            </a:r>
-            <a:endParaRPr lang="en-US" dirty="0"/>
-          </a:p>
-        </p:txBody>
-      </p:sp>
+        </p:nvPicPr>
+        <p:blipFill>
+          <a:blip r:embed="rId2"/>
+          <a:srcRect t="-2895" b="-2895"/>
+          <a:stretch>
+            <a:fillRect/>
+          </a:stretch>
+        </p:blipFill>
+        <p:spPr>
+          <a:xfrm>
+            <a:off x="0" y="1270031"/>
+            <a:ext cx="9144000" cy="5587969"/>
+          </a:xfrm>
+        </p:spPr>
+      </p:pic>
     </p:spTree>
   </p:cSld>
   <p:clrMapOvr>
     <a:masterClrMapping/>
   </p:clrMapOvr>
-  <p:timing>
-    <p:tnLst>
-      <p:par>
-        <p:cTn id="1" dur="indefinite" restart="never" nodeType="tmRoot"/>
-      </p:par>
-    </p:tnLst>
-  </p:timing>
+</p:sld>
+</file>
+
+<file path=ppt/slides/slide28.xml><?xml version="1.0" encoding="utf-8"?>
+<p:sld xmlns:a="http://schemas.openxmlformats.org/drawingml/2006/main" xmlns:r="http://schemas.openxmlformats.org/officeDocument/2006/relationships" xmlns:mc="http://schemas.openxmlformats.org/markup-compatibility/2006" xmlns:mv="urn:schemas-microsoft-com:mac:vml" xmlns:p="http://schemas.openxmlformats.org/presentationml/2006/main" mc:Ignorable="mv" mc:PreserveAttributes="mv:*">
+  <p:cSld>
+    <p:spTree>
+      <p:nvGrpSpPr>
+        <p:cNvPr id="1" name=""/>
+        <p:cNvGrpSpPr/>
+        <p:nvPr/>
+      </p:nvGrpSpPr>
+      <p:grpSpPr>
+        <a:xfrm>
+          <a:off x="0" y="0"/>
+          <a:ext cx="0" cy="0"/>
+          <a:chOff x="0" y="0"/>
+          <a:chExt cx="0" cy="0"/>
+        </a:xfrm>
+      </p:grpSpPr>
+      <p:sp>
+        <p:nvSpPr>
+          <p:cNvPr id="2" name="Title 1"/>
+          <p:cNvSpPr>
+            <a:spLocks noGrp="1"/>
+          </p:cNvSpPr>
+          <p:nvPr>
+            <p:ph type="title"/>
+          </p:nvPr>
+        </p:nvSpPr>
+        <p:spPr>
+          <a:xfrm>
+            <a:off x="914400" y="69057"/>
+            <a:ext cx="7313613" cy="868362"/>
+          </a:xfrm>
+        </p:spPr>
+        <p:txBody>
+          <a:bodyPr/>
+          <a:lstStyle/>
+          <a:p>
+            <a:r>
+              <a:rPr lang="en-US" dirty="0" smtClean="0"/>
+              <a:t>Game #4-5</a:t>
+            </a:r>
+            <a:endParaRPr lang="en-US" dirty="0"/>
+          </a:p>
+        </p:txBody>
+      </p:sp>
+      <p:pic>
+        <p:nvPicPr>
+          <p:cNvPr id="4" name="Content Placeholder 3" descr="fast_mpc_u2.png"/>
+          <p:cNvPicPr>
+            <a:picLocks noGrp="1" noChangeAspect="1"/>
+          </p:cNvPicPr>
+          <p:nvPr>
+            <p:ph idx="1"/>
+          </p:nvPr>
+        </p:nvPicPr>
+        <p:blipFill>
+          <a:blip r:embed="rId2"/>
+          <a:srcRect t="-3034" b="-3034"/>
+          <a:stretch>
+            <a:fillRect/>
+          </a:stretch>
+        </p:blipFill>
+        <p:spPr>
+          <a:xfrm>
+            <a:off x="-19332" y="1378279"/>
+            <a:ext cx="9218791" cy="5392536"/>
+          </a:xfrm>
+        </p:spPr>
+      </p:pic>
+    </p:spTree>
+  </p:cSld>
+  <p:clrMapOvr>
+    <a:masterClrMapping/>
+  </p:clrMapOvr>
+</p:sld>
+</file>
+
+<file path=ppt/slides/slide29.xml><?xml version="1.0" encoding="utf-8"?>
+<p:sld xmlns:a="http://schemas.openxmlformats.org/drawingml/2006/main" xmlns:r="http://schemas.openxmlformats.org/officeDocument/2006/relationships" xmlns:mc="http://schemas.openxmlformats.org/markup-compatibility/2006" xmlns:mv="urn:schemas-microsoft-com:mac:vml" xmlns:p="http://schemas.openxmlformats.org/presentationml/2006/main" mc:Ignorable="mv" mc:PreserveAttributes="mv:*">
+  <p:cSld>
+    <p:spTree>
+      <p:nvGrpSpPr>
+        <p:cNvPr id="1" name=""/>
+        <p:cNvGrpSpPr/>
+        <p:nvPr/>
+      </p:nvGrpSpPr>
+      <p:grpSpPr>
+        <a:xfrm>
+          <a:off x="0" y="0"/>
+          <a:ext cx="0" cy="0"/>
+          <a:chOff x="0" y="0"/>
+          <a:chExt cx="0" cy="0"/>
+        </a:xfrm>
+      </p:grpSpPr>
+      <p:sp>
+        <p:nvSpPr>
+          <p:cNvPr id="2" name="Title 1"/>
+          <p:cNvSpPr>
+            <a:spLocks noGrp="1"/>
+          </p:cNvSpPr>
+          <p:nvPr>
+            <p:ph type="title"/>
+          </p:nvPr>
+        </p:nvSpPr>
+        <p:spPr/>
+        <p:txBody>
+          <a:bodyPr/>
+          <a:lstStyle/>
+          <a:p>
+            <a:r>
+              <a:rPr lang="en-US" dirty="0" smtClean="0"/>
+              <a:t>Current Status</a:t>
+            </a:r>
+            <a:endParaRPr lang="en-US" dirty="0"/>
+          </a:p>
+        </p:txBody>
+      </p:sp>
+      <p:sp>
+        <p:nvSpPr>
+          <p:cNvPr id="3" name="Content Placeholder 2"/>
+          <p:cNvSpPr>
+            <a:spLocks noGrp="1"/>
+          </p:cNvSpPr>
+          <p:nvPr>
+            <p:ph idx="1"/>
+          </p:nvPr>
+        </p:nvSpPr>
+        <p:spPr/>
+        <p:txBody>
+          <a:bodyPr>
+            <a:normAutofit lnSpcReduction="10000"/>
+          </a:bodyPr>
+          <a:lstStyle/>
+          <a:p>
+            <a:r>
+              <a:rPr lang="en-US" dirty="0" smtClean="0"/>
+              <a:t>Fast MPC implementation from Wang/Boyd does not handle tracker case:</a:t>
+            </a:r>
+          </a:p>
+          <a:p>
+            <a:pPr lvl="1"/>
+            <a:r>
+              <a:rPr lang="en-US" dirty="0" smtClean="0"/>
+              <a:t>Expanded implementation of the code.</a:t>
+            </a:r>
+          </a:p>
+          <a:p>
+            <a:pPr lvl="2"/>
+            <a:r>
+              <a:rPr lang="en-US" dirty="0" smtClean="0"/>
+              <a:t>takes about 10ms on PC</a:t>
+            </a:r>
+          </a:p>
+          <a:p>
+            <a:pPr lvl="1"/>
+            <a:r>
+              <a:rPr lang="en-US" dirty="0" smtClean="0"/>
+              <a:t>Formulation in Wang/Boyd requires a full-rank hessian</a:t>
+            </a:r>
+          </a:p>
+          <a:p>
+            <a:pPr lvl="2"/>
+            <a:r>
+              <a:rPr lang="en-US" dirty="0" smtClean="0"/>
+              <a:t>Discuss implications…</a:t>
+            </a:r>
+          </a:p>
+          <a:p>
+            <a:r>
+              <a:rPr lang="en-US" dirty="0" smtClean="0"/>
+              <a:t>Literature indicates that people are using </a:t>
+            </a:r>
+            <a:r>
+              <a:rPr lang="en-US" dirty="0" err="1" smtClean="0"/>
+              <a:t>FPGAs</a:t>
+            </a:r>
+            <a:r>
+              <a:rPr lang="en-US" dirty="0" smtClean="0"/>
+              <a:t> to speed-up MPC problems; </a:t>
+            </a:r>
+          </a:p>
+          <a:p>
+            <a:pPr lvl="1"/>
+            <a:r>
+              <a:rPr lang="en-US" dirty="0" smtClean="0"/>
+              <a:t>Seems like the computation power is there; </a:t>
+            </a:r>
+          </a:p>
+          <a:p>
+            <a:pPr lvl="1"/>
+            <a:r>
+              <a:rPr lang="en-US" dirty="0" smtClean="0"/>
+              <a:t>but so far no one has used it on a flying vehicle online?</a:t>
+            </a:r>
+            <a:endParaRPr lang="en-US" dirty="0" smtClean="0"/>
+          </a:p>
+          <a:p>
+            <a:pPr lvl="1"/>
+            <a:endParaRPr lang="en-US" dirty="0" smtClean="0"/>
+          </a:p>
+          <a:p>
+            <a:endParaRPr lang="en-US" dirty="0"/>
+          </a:p>
+        </p:txBody>
+      </p:sp>
+    </p:spTree>
+  </p:cSld>
+  <p:clrMapOvr>
+    <a:masterClrMapping/>
+  </p:clrMapOvr>
 </p:sld>
 </file>
 
@@ -10179,11 +10177,7 @@
             <a:pPr lvl="1"/>
             <a:r>
               <a:rPr lang="en-US" dirty="0" smtClean="0"/>
-              <a:t>Subset of Optimal Control </a:t>
-            </a:r>
-            <a:r>
-              <a:rPr lang="en-US" dirty="0" smtClean="0"/>
-              <a:t>Theory</a:t>
+              <a:t>Subset of Optimal Control Theory</a:t>
             </a:r>
           </a:p>
           <a:p>
@@ -10225,6 +10219,339 @@
             <a:pPr lvl="1">
               <a:buNone/>
             </a:pPr>
+            <a:endParaRPr lang="en-US" dirty="0"/>
+          </a:p>
+        </p:txBody>
+      </p:sp>
+    </p:spTree>
+  </p:cSld>
+  <p:clrMapOvr>
+    <a:masterClrMapping/>
+  </p:clrMapOvr>
+  <p:timing>
+    <p:tnLst>
+      <p:par>
+        <p:cTn id="1" dur="indefinite" restart="never" nodeType="tmRoot"/>
+      </p:par>
+    </p:tnLst>
+  </p:timing>
+</p:sld>
+</file>
+
+<file path=ppt/slides/slide30.xml><?xml version="1.0" encoding="utf-8"?>
+<p:sld xmlns:a="http://schemas.openxmlformats.org/drawingml/2006/main" xmlns:r="http://schemas.openxmlformats.org/officeDocument/2006/relationships" xmlns:mc="http://schemas.openxmlformats.org/markup-compatibility/2006" xmlns:mv="urn:schemas-microsoft-com:mac:vml" xmlns:p="http://schemas.openxmlformats.org/presentationml/2006/main" mc:Ignorable="mv" mc:PreserveAttributes="mv:*">
+  <p:cSld>
+    <p:spTree>
+      <p:nvGrpSpPr>
+        <p:cNvPr id="1" name=""/>
+        <p:cNvGrpSpPr/>
+        <p:nvPr/>
+      </p:nvGrpSpPr>
+      <p:grpSpPr>
+        <a:xfrm>
+          <a:off x="0" y="0"/>
+          <a:ext cx="0" cy="0"/>
+          <a:chOff x="0" y="0"/>
+          <a:chExt cx="0" cy="0"/>
+        </a:xfrm>
+      </p:grpSpPr>
+      <p:sp>
+        <p:nvSpPr>
+          <p:cNvPr id="2" name="Title 1"/>
+          <p:cNvSpPr>
+            <a:spLocks noGrp="1"/>
+          </p:cNvSpPr>
+          <p:nvPr>
+            <p:ph type="title"/>
+          </p:nvPr>
+        </p:nvSpPr>
+        <p:spPr/>
+        <p:txBody>
+          <a:bodyPr/>
+          <a:lstStyle/>
+          <a:p>
+            <a:r>
+              <a:rPr lang="en-US" dirty="0" smtClean="0"/>
+              <a:t>Equations …</a:t>
+            </a:r>
+            <a:endParaRPr lang="en-US" dirty="0"/>
+          </a:p>
+        </p:txBody>
+      </p:sp>
+      <p:sp>
+        <p:nvSpPr>
+          <p:cNvPr id="3" name="Content Placeholder 2"/>
+          <p:cNvSpPr>
+            <a:spLocks noGrp="1"/>
+          </p:cNvSpPr>
+          <p:nvPr>
+            <p:ph idx="1"/>
+          </p:nvPr>
+        </p:nvSpPr>
+        <p:spPr/>
+        <p:txBody>
+          <a:bodyPr>
+            <a:normAutofit fontScale="62500" lnSpcReduction="20000"/>
+          </a:bodyPr>
+          <a:lstStyle/>
+          <a:p>
+            <a:r>
+              <a:rPr lang="en-US" dirty="0" smtClean="0"/>
+              <a:t>Objective: J(x(0),U_0) = \overset{N-1}{\underset{k=0}{\Sigma}}(x^t_kQx_k + </a:t>
+            </a:r>
+            <a:r>
+              <a:rPr lang="en-US" dirty="0" err="1" smtClean="0"/>
+              <a:t>u^t_kRu_k</a:t>
+            </a:r>
+            <a:r>
+              <a:rPr lang="en-US" dirty="0" smtClean="0"/>
+              <a:t>) + </a:t>
+            </a:r>
+            <a:r>
+              <a:rPr lang="en-US" dirty="0" err="1" smtClean="0"/>
+              <a:t>x^t_NPx_N</a:t>
+            </a:r>
+            <a:endParaRPr lang="en-US" dirty="0" smtClean="0"/>
+          </a:p>
+          <a:p>
+            <a:r>
+              <a:rPr lang="en-US" dirty="0" smtClean="0"/>
+              <a:t>Optimization: \</a:t>
+            </a:r>
+            <a:r>
+              <a:rPr lang="en-US" dirty="0" err="1" smtClean="0"/>
+              <a:t>begin{aligned</a:t>
+            </a:r>
+            <a:r>
+              <a:rPr lang="en-US" dirty="0" smtClean="0"/>
+              <a:t>}&amp; \underset{U_0}{\text{minimize}}&amp; &amp; J(x(0),U_0) \\&amp; \</a:t>
+            </a:r>
+            <a:r>
+              <a:rPr lang="en-US" dirty="0" err="1" smtClean="0"/>
+              <a:t>text{subject</a:t>
+            </a:r>
+            <a:r>
+              <a:rPr lang="en-US" dirty="0" smtClean="0"/>
+              <a:t> to}&amp; &amp; x(k+1) = </a:t>
+            </a:r>
+            <a:r>
+              <a:rPr lang="en-US" dirty="0" err="1" smtClean="0"/>
+              <a:t>Ax(k</a:t>
+            </a:r>
+            <a:r>
+              <a:rPr lang="en-US" dirty="0" smtClean="0"/>
+              <a:t>) + </a:t>
+            </a:r>
+            <a:r>
+              <a:rPr lang="en-US" dirty="0" err="1" smtClean="0"/>
+              <a:t>Bu(k</a:t>
+            </a:r>
+            <a:r>
+              <a:rPr lang="en-US" dirty="0" smtClean="0"/>
+              <a:t>)\ </a:t>
+            </a:r>
+            <a:r>
+              <a:rPr lang="en-US" dirty="0" err="1" smtClean="0"/>
+              <a:t>k</a:t>
+            </a:r>
+            <a:r>
+              <a:rPr lang="en-US" dirty="0" smtClean="0"/>
+              <a:t> = 1, \</a:t>
+            </a:r>
+            <a:r>
+              <a:rPr lang="en-US" dirty="0" err="1" smtClean="0"/>
+              <a:t>ldots</a:t>
+            </a:r>
+            <a:r>
+              <a:rPr lang="en-US" dirty="0" smtClean="0"/>
+              <a:t>, N-1 \\&amp; &amp; &amp; x_0 = x(0) \\&amp; &amp; &amp; </a:t>
+            </a:r>
+            <a:r>
+              <a:rPr lang="en-US" dirty="0" err="1" smtClean="0"/>
+              <a:t>x(N</a:t>
+            </a:r>
+            <a:r>
+              <a:rPr lang="en-US" dirty="0" smtClean="0"/>
+              <a:t>) \in \</a:t>
+            </a:r>
+            <a:r>
+              <a:rPr lang="en-US" dirty="0" err="1" smtClean="0"/>
+              <a:t>chi_{f</a:t>
+            </a:r>
+            <a:r>
+              <a:rPr lang="en-US" dirty="0" smtClean="0"/>
+              <a:t>} \\&amp; &amp; &amp; G X \le </a:t>
+            </a:r>
+            <a:r>
+              <a:rPr lang="en-US" dirty="0" err="1" smtClean="0"/>
+              <a:t>h</a:t>
+            </a:r>
+            <a:r>
+              <a:rPr lang="en-US" dirty="0" smtClean="0"/>
+              <a:t> \\&amp; &amp; &amp; F U \le </a:t>
+            </a:r>
+            <a:r>
+              <a:rPr lang="en-US" dirty="0" err="1" smtClean="0"/>
+              <a:t>e\end{aligned</a:t>
+            </a:r>
+            <a:r>
+              <a:rPr lang="en-US" dirty="0" smtClean="0"/>
+              <a:t>}</a:t>
+            </a:r>
+          </a:p>
+          <a:p>
+            <a:r>
+              <a:rPr lang="en-US" dirty="0" smtClean="0"/>
+              <a:t>EOM: \</a:t>
+            </a:r>
+            <a:r>
+              <a:rPr lang="en-US" dirty="0" err="1" smtClean="0"/>
+              <a:t>dot{x</a:t>
+            </a:r>
+            <a:r>
+              <a:rPr lang="en-US" dirty="0" smtClean="0"/>
+              <a:t>} = \left[\</a:t>
+            </a:r>
+            <a:r>
+              <a:rPr lang="en-US" dirty="0" err="1" smtClean="0"/>
+              <a:t>begin{array}{c</a:t>
+            </a:r>
+            <a:r>
+              <a:rPr lang="en-US" dirty="0" smtClean="0"/>
+              <a:t>}\dot{\theta} \\\</a:t>
+            </a:r>
+            <a:r>
+              <a:rPr lang="en-US" dirty="0" err="1" smtClean="0"/>
+              <a:t>dot{q}\end{array}\right</a:t>
+            </a:r>
+            <a:r>
+              <a:rPr lang="en-US" dirty="0" smtClean="0"/>
+              <a:t>] = \left[\begin{array}{cc}0 &amp; 1\\0 &amp; 0\end{array}\right]\left[\begin{array}{c}\theta \\</a:t>
+            </a:r>
+            <a:r>
+              <a:rPr lang="en-US" dirty="0" err="1" smtClean="0"/>
+              <a:t>q\end{array}\right</a:t>
+            </a:r>
+            <a:r>
+              <a:rPr lang="en-US" dirty="0" smtClean="0"/>
+              <a:t>] + \frac{1}{I_{yy}}\left[\begin{array}{cccc}0 &amp; 0 &amp; 0 &amp; 0\\d_1 &amp; d_2 &amp; d_3 &amp; d_4\end{array}\right]\left[\begin{array}{c}t_1 \\\ldots\\t_4\end{array}\right] \\\left[\</a:t>
+            </a:r>
+            <a:r>
+              <a:rPr lang="en-US" dirty="0" err="1" smtClean="0"/>
+              <a:t>begin{array}{c}F_{x,i</a:t>
+            </a:r>
+            <a:r>
+              <a:rPr lang="en-US" dirty="0" smtClean="0"/>
+              <a:t>} \\</a:t>
+            </a:r>
+            <a:r>
+              <a:rPr lang="en-US" dirty="0" err="1" smtClean="0"/>
+              <a:t>F_{z,i}\end{array}\right</a:t>
+            </a:r>
+            <a:r>
+              <a:rPr lang="en-US" dirty="0" smtClean="0"/>
+              <a:t>] = \left[\</a:t>
+            </a:r>
+            <a:r>
+              <a:rPr lang="en-US" dirty="0" err="1" smtClean="0"/>
+              <a:t>begin{array}{cc}\cos</a:t>
+            </a:r>
+            <a:r>
+              <a:rPr lang="en-US" dirty="0" smtClean="0"/>
+              <a:t> \theta &amp; -\sin \theta \\-\sin \theta &amp; -\</a:t>
+            </a:r>
+            <a:r>
+              <a:rPr lang="en-US" dirty="0" err="1" smtClean="0"/>
+              <a:t>cos</a:t>
+            </a:r>
+            <a:r>
+              <a:rPr lang="en-US" dirty="0" smtClean="0"/>
+              <a:t> \theta\end{array}\right]\left[\begin{array}{c}0 \\\Sigma </a:t>
+            </a:r>
+            <a:r>
+              <a:rPr lang="en-US" dirty="0" err="1" smtClean="0"/>
+              <a:t>t_i\end{array}\right</a:t>
+            </a:r>
+            <a:r>
+              <a:rPr lang="en-US" dirty="0" smtClean="0"/>
+              <a:t>]</a:t>
+            </a:r>
+          </a:p>
+          <a:p>
+            <a:r>
+              <a:rPr lang="en-US" dirty="0" smtClean="0"/>
+              <a:t>Final Set constraint: </a:t>
+            </a:r>
+            <a:r>
+              <a:rPr lang="en-US" dirty="0" err="1" smtClean="0"/>
+              <a:t>x_N</a:t>
+            </a:r>
+            <a:r>
+              <a:rPr lang="en-US" dirty="0" smtClean="0"/>
+              <a:t> = </a:t>
+            </a:r>
+            <a:r>
+              <a:rPr lang="en-US" dirty="0" err="1" smtClean="0"/>
+              <a:t>Ax_N</a:t>
+            </a:r>
+            <a:r>
+              <a:rPr lang="en-US" dirty="0" smtClean="0"/>
+              <a:t> + Bu_{N-1} + </a:t>
+            </a:r>
+            <a:r>
+              <a:rPr lang="en-US" dirty="0" err="1" smtClean="0"/>
+              <a:t>B_d</a:t>
+            </a:r>
+            <a:r>
+              <a:rPr lang="en-US" dirty="0" smtClean="0"/>
+              <a:t> \</a:t>
+            </a:r>
+            <a:r>
+              <a:rPr lang="en-US" dirty="0" err="1" smtClean="0"/>
+              <a:t>hat{M}_{yd</a:t>
+            </a:r>
+            <a:r>
+              <a:rPr lang="en-US" dirty="0" smtClean="0"/>
+              <a:t>}\\</a:t>
+            </a:r>
+          </a:p>
+          <a:p>
+            <a:r>
+              <a:rPr lang="en-US" dirty="0" smtClean="0"/>
+              <a:t>Disturbance: x_{k+1} = </a:t>
+            </a:r>
+            <a:r>
+              <a:rPr lang="en-US" dirty="0" err="1" smtClean="0"/>
+              <a:t>Ax_{k</a:t>
+            </a:r>
+            <a:r>
+              <a:rPr lang="en-US" dirty="0" smtClean="0"/>
+              <a:t>} + </a:t>
+            </a:r>
+            <a:r>
+              <a:rPr lang="en-US" dirty="0" err="1" smtClean="0"/>
+              <a:t>Bu_{k</a:t>
+            </a:r>
+            <a:r>
+              <a:rPr lang="en-US" dirty="0" smtClean="0"/>
+              <a:t>} + </a:t>
+            </a:r>
+            <a:r>
+              <a:rPr lang="en-US" dirty="0" err="1" smtClean="0"/>
+              <a:t>B_d</a:t>
+            </a:r>
+            <a:r>
+              <a:rPr lang="en-US" dirty="0" smtClean="0"/>
+              <a:t> \</a:t>
+            </a:r>
+            <a:r>
+              <a:rPr lang="en-US" dirty="0" err="1" smtClean="0"/>
+              <a:t>hat{M}_{yd</a:t>
+            </a:r>
+            <a:r>
+              <a:rPr lang="en-US" dirty="0" smtClean="0"/>
+              <a:t>}\\</a:t>
+            </a:r>
             <a:endParaRPr lang="en-US" dirty="0"/>
           </a:p>
         </p:txBody>
@@ -10542,19 +10869,7 @@
           <a:p>
             <a:r>
               <a:rPr lang="en-US" dirty="0" smtClean="0"/>
-              <a:t>Predictive </a:t>
-            </a:r>
-            <a:r>
-              <a:rPr lang="en-US" dirty="0" smtClean="0"/>
-              <a:t>Control for linear and hybrid </a:t>
-            </a:r>
-            <a:r>
-              <a:rPr lang="en-US" dirty="0" smtClean="0"/>
-              <a:t>systems; F</a:t>
-            </a:r>
-            <a:r>
-              <a:rPr lang="en-US" dirty="0" smtClean="0"/>
-              <a:t>. </a:t>
+              <a:t>Predictive Control for linear and hybrid systems; F. </a:t>
             </a:r>
             <a:r>
               <a:rPr lang="en-US" dirty="0" err="1" smtClean="0"/>

</xml_diff>